<commit_message>
Fix defect: Add cancel button when edit profile
</commit_message>
<xml_diff>
--- a/doc/frontend/wireframe/TRN-MiniBlog_WireframeDesign_TRILE.pptx
+++ b/doc/frontend/wireframe/TRN-MiniBlog_WireframeDesign_TRILE.pptx
@@ -242,7 +242,7 @@
           </a:lstStyle>
           <a:p>
             <a:fld id="{0B14D75D-3A88-044C-B530-B9A2A8B351DB}" type="datetimeFigureOut">
-              <a:t>1/20/15</a:t>
+              <a:t>1/21/15</a:t>
             </a:fld>
             <a:endParaRPr kumimoji="1" lang="ja-JP" altLang="en-US"/>
           </a:p>
@@ -699,7 +699,7 @@
                 <a:ea typeface="ＭＳ Ｐゴシック"/>
               </a:rPr>
               <a:pPr/>
-              <a:t>1/20/15</a:t>
+              <a:t>1/21/15</a:t>
             </a:fld>
             <a:endParaRPr lang="ja-JP" altLang="en-US">
               <a:solidFill>
@@ -943,7 +943,7 @@
                 <a:ea typeface="ＭＳ Ｐゴシック"/>
               </a:rPr>
               <a:pPr/>
-              <a:t>1/20/15</a:t>
+              <a:t>1/21/15</a:t>
             </a:fld>
             <a:endParaRPr lang="ja-JP" altLang="en-US">
               <a:solidFill>
@@ -1197,7 +1197,7 @@
                 <a:ea typeface="ＭＳ Ｐゴシック"/>
               </a:rPr>
               <a:pPr/>
-              <a:t>1/20/15</a:t>
+              <a:t>1/21/15</a:t>
             </a:fld>
             <a:endParaRPr lang="ja-JP" altLang="en-US">
               <a:solidFill>
@@ -1334,7 +1334,7 @@
                 <a:ea typeface="ＭＳ Ｐゴシック"/>
               </a:rPr>
               <a:pPr/>
-              <a:t>1/20/15</a:t>
+              <a:t>1/21/15</a:t>
             </a:fld>
             <a:endParaRPr lang="ja-JP" altLang="en-US">
               <a:solidFill>
@@ -2005,7 +2005,7 @@
                 <a:ea typeface="ＭＳ Ｐゴシック"/>
               </a:rPr>
               <a:pPr/>
-              <a:t>1/20/15</a:t>
+              <a:t>1/21/15</a:t>
             </a:fld>
             <a:endParaRPr lang="ja-JP" altLang="en-US">
               <a:solidFill>
@@ -2676,7 +2676,7 @@
                 <a:ea typeface="ＭＳ Ｐゴシック"/>
               </a:rPr>
               <a:pPr/>
-              <a:t>1/20/15</a:t>
+              <a:t>1/21/15</a:t>
             </a:fld>
             <a:endParaRPr lang="ja-JP" altLang="en-US">
               <a:solidFill>
@@ -3454,7 +3454,7 @@
                 <a:ea typeface="ＭＳ Ｐゴシック"/>
               </a:rPr>
               <a:pPr/>
-              <a:t>1/20/15</a:t>
+              <a:t>1/21/15</a:t>
             </a:fld>
             <a:endParaRPr lang="ja-JP" altLang="en-US">
               <a:solidFill>
@@ -3992,7 +3992,7 @@
                 <a:ea typeface="ＭＳ Ｐゴシック"/>
               </a:rPr>
               <a:pPr/>
-              <a:t>1/20/15</a:t>
+              <a:t>1/21/15</a:t>
             </a:fld>
             <a:endParaRPr lang="ja-JP" altLang="en-US">
               <a:solidFill>
@@ -4386,7 +4386,7 @@
                 <a:ea typeface="ＭＳ Ｐゴシック"/>
               </a:rPr>
               <a:pPr/>
-              <a:t>1/20/15</a:t>
+              <a:t>1/21/15</a:t>
             </a:fld>
             <a:endParaRPr lang="ja-JP" altLang="en-US">
               <a:solidFill>
@@ -5277,7 +5277,7 @@
                 <a:ea typeface="ＭＳ Ｐゴシック"/>
               </a:rPr>
               <a:pPr/>
-              <a:t>1/20/15</a:t>
+              <a:t>1/21/15</a:t>
             </a:fld>
             <a:endParaRPr lang="ja-JP" altLang="en-US">
               <a:solidFill>
@@ -5437,7 +5437,7 @@
                 <a:ea typeface="ＭＳ Ｐゴシック"/>
               </a:rPr>
               <a:pPr/>
-              <a:t>1/20/15</a:t>
+              <a:t>1/21/15</a:t>
             </a:fld>
             <a:endParaRPr lang="ja-JP" altLang="en-US">
               <a:solidFill>
@@ -5574,7 +5574,7 @@
                 <a:ea typeface="ＭＳ Ｐゴシック"/>
               </a:rPr>
               <a:pPr/>
-              <a:t>1/20/15</a:t>
+              <a:t>1/21/15</a:t>
             </a:fld>
             <a:endParaRPr lang="ja-JP" altLang="en-US">
               <a:solidFill>
@@ -5925,7 +5925,7 @@
                 <a:ea typeface="ＭＳ Ｐゴシック"/>
               </a:rPr>
               <a:pPr/>
-              <a:t>1/20/15</a:t>
+              <a:t>1/21/15</a:t>
             </a:fld>
             <a:endParaRPr lang="ja-JP" altLang="en-US">
               <a:solidFill>
@@ -6220,7 +6220,7 @@
                 <a:ea typeface="ＭＳ Ｐゴシック"/>
               </a:rPr>
               <a:pPr/>
-              <a:t>1/20/15</a:t>
+              <a:t>1/21/15</a:t>
             </a:fld>
             <a:endParaRPr lang="ja-JP" altLang="en-US">
               <a:solidFill>
@@ -6507,7 +6507,7 @@
                 <a:ea typeface="ＭＳ Ｐゴシック"/>
               </a:rPr>
               <a:pPr/>
-              <a:t>1/20/15</a:t>
+              <a:t>1/21/15</a:t>
             </a:fld>
             <a:endParaRPr kumimoji="1" lang="ja-JP" altLang="en-US">
               <a:solidFill>
@@ -7430,15 +7430,7 @@
           <a:p>
             <a:r>
               <a:rPr kumimoji="1" lang="en-US" altLang="ja-JP" dirty="0" smtClean="0"/>
-              <a:t>S-3-6</a:t>
-            </a:r>
-            <a:r>
-              <a:rPr kumimoji="1" lang="en-US" altLang="ja-JP" dirty="0" smtClean="0"/>
-              <a:t> </a:t>
-            </a:r>
-            <a:r>
-              <a:rPr kumimoji="1" lang="en-US" altLang="ja-JP" dirty="0" smtClean="0"/>
-              <a:t>Edit comment</a:t>
+              <a:t>S-3-6 Edit comment</a:t>
             </a:r>
             <a:endParaRPr kumimoji="1" lang="ja-JP" altLang="en-US" dirty="0"/>
           </a:p>
@@ -7484,14 +7476,6 @@
           <a:lstStyle/>
           <a:p>
             <a:pPr algn="ctr"/>
-            <a:r>
-              <a:rPr kumimoji="1" lang="en-US" altLang="ja-JP" dirty="0" smtClean="0">
-                <a:solidFill>
-                  <a:srgbClr val="FF0000"/>
-                </a:solidFill>
-              </a:rPr>
-              <a:t/>
-            </a:r>
             <a:endParaRPr kumimoji="1" lang="ja-JP" altLang="en-US" dirty="0">
               <a:solidFill>
                 <a:srgbClr val="FF0000"/>
@@ -7637,14 +7621,14 @@
           <p:nvPr>
             <p:extLst>
               <p:ext uri="{D42A27DB-BD31-4B8C-83A1-F6EECF244321}">
-                <p14:modId xmlns:p14="http://schemas.microsoft.com/office/powerpoint/2010/main" val="2947314178"/>
+                <p14:modId xmlns:p14="http://schemas.microsoft.com/office/powerpoint/2010/main" val="3858482067"/>
               </p:ext>
             </p:extLst>
           </p:nvPr>
         </p:nvGraphicFramePr>
         <p:xfrm>
           <a:off x="5156198" y="1009450"/>
-          <a:ext cx="3903137" cy="723322"/>
+          <a:ext cx="3903137" cy="875722"/>
         </p:xfrm>
         <a:graphic>
           <a:graphicData uri="http://schemas.openxmlformats.org/drawingml/2006/table">
@@ -7794,11 +7778,26 @@
                       </a:pPr>
                       <a:r>
                         <a:rPr kumimoji="1" lang="en-US" altLang="ja-JP" sz="1000" dirty="0" smtClean="0"/>
+                        <a:t>Input new comment</a:t>
+                      </a:r>
+                      <a:r>
+                        <a:rPr kumimoji="1" lang="en-US" altLang="ja-JP" sz="1000" dirty="0" smtClean="0"/>
+                        <a:t/>
+                      </a:r>
+                      <a:br>
+                        <a:rPr kumimoji="1" lang="en-US" altLang="ja-JP" sz="1000" dirty="0" smtClean="0"/>
+                      </a:br>
+                      <a:r>
+                        <a:rPr kumimoji="1" lang="en-US" altLang="ja-JP" sz="1000" dirty="0" smtClean="0"/>
                         <a:t>Enter</a:t>
                       </a:r>
                       <a:r>
                         <a:rPr kumimoji="1" lang="en-US" altLang="ja-JP" sz="1000" baseline="0" dirty="0" smtClean="0"/>
-                        <a:t> to send edit content</a:t>
+                        <a:t> </a:t>
+                      </a:r>
+                      <a:r>
+                        <a:rPr kumimoji="1" lang="en-US" altLang="ja-JP" sz="1000" baseline="0" dirty="0" smtClean="0"/>
+                        <a:t>to send edit content</a:t>
                       </a:r>
                       <a:endParaRPr kumimoji="1" lang="ja-JP" altLang="en-US" sz="1000" dirty="0"/>
                     </a:p>
@@ -9359,11 +9358,7 @@
             </a:r>
             <a:r>
               <a:rPr kumimoji="1" lang="en-US" altLang="ja-JP" dirty="0" smtClean="0"/>
-              <a:t>-3-7 </a:t>
-            </a:r>
-            <a:r>
-              <a:rPr kumimoji="1" lang="en-US" altLang="ja-JP" dirty="0" smtClean="0"/>
-              <a:t>Change password</a:t>
+              <a:t>-3-7 Change password</a:t>
             </a:r>
             <a:endParaRPr kumimoji="1" lang="ja-JP" altLang="en-US" dirty="0"/>
           </a:p>
@@ -10658,11 +10653,7 @@
             </a:r>
             <a:r>
               <a:rPr kumimoji="1" lang="en-US" altLang="ja-JP" dirty="0" smtClean="0"/>
-              <a:t>-5-1 </a:t>
-            </a:r>
-            <a:r>
-              <a:rPr kumimoji="1" lang="en-US" altLang="ja-JP" dirty="0" smtClean="0"/>
-              <a:t>Register</a:t>
+              <a:t>-5-1 Register</a:t>
             </a:r>
             <a:endParaRPr kumimoji="1" lang="ja-JP" altLang="en-US" dirty="0"/>
           </a:p>
@@ -15477,11 +15468,7 @@
             </a:r>
             <a:r>
               <a:rPr kumimoji="1" lang="en-US" altLang="ja-JP" dirty="0" smtClean="0"/>
-              <a:t>-3-5 </a:t>
-            </a:r>
-            <a:r>
-              <a:rPr kumimoji="1" lang="en-US" altLang="ja-JP" dirty="0" smtClean="0"/>
-              <a:t>Edit post</a:t>
+              <a:t>-3-5 Edit post</a:t>
             </a:r>
             <a:endParaRPr kumimoji="1" lang="ja-JP" altLang="en-US" dirty="0"/>
           </a:p>
@@ -15527,14 +15514,6 @@
           <a:lstStyle/>
           <a:p>
             <a:pPr algn="ctr"/>
-            <a:r>
-              <a:rPr kumimoji="1" lang="en-US" altLang="ja-JP" dirty="0" smtClean="0">
-                <a:solidFill>
-                  <a:srgbClr val="FF0000"/>
-                </a:solidFill>
-              </a:rPr>
-              <a:t/>
-            </a:r>
             <a:endParaRPr kumimoji="1" lang="ja-JP" altLang="en-US" dirty="0">
               <a:solidFill>
                 <a:srgbClr val="FF0000"/>
@@ -17564,7 +17543,6 @@
               <a:rPr kumimoji="1" lang="en-US" altLang="ja-JP" sz="1000" dirty="0" smtClean="0"/>
               <a:t>Welcome</a:t>
             </a:r>
-            <a:endParaRPr kumimoji="1" lang="en-US" altLang="ja-JP" sz="1000" dirty="0" smtClean="0"/>
           </a:p>
         </p:txBody>
       </p:sp>
@@ -17930,11 +17908,7 @@
           <a:p>
             <a:r>
               <a:rPr kumimoji="1" lang="en-US" altLang="ja-JP" sz="1000" dirty="0" smtClean="0"/>
-              <a:t>Post d</a:t>
-            </a:r>
-            <a:r>
-              <a:rPr kumimoji="1" lang="en-US" altLang="ja-JP" sz="1000" dirty="0" smtClean="0"/>
-              <a:t>etail</a:t>
+              <a:t>Post detail</a:t>
             </a:r>
             <a:endParaRPr kumimoji="1" lang="ja-JP" altLang="en-US" sz="1000" dirty="0"/>
           </a:p>
@@ -19234,7 +19208,7 @@
           <p:nvPr>
             <p:extLst>
               <p:ext uri="{D42A27DB-BD31-4B8C-83A1-F6EECF244321}">
-                <p14:modId xmlns:p14="http://schemas.microsoft.com/office/powerpoint/2010/main" val="3603808304"/>
+                <p14:modId xmlns:p14="http://schemas.microsoft.com/office/powerpoint/2010/main" val="1574759024"/>
               </p:ext>
             </p:extLst>
           </p:nvPr>
@@ -19398,7 +19372,15 @@
                       </a:r>
                       <a:r>
                         <a:rPr kumimoji="1" lang="en-US" altLang="ja-JP" sz="1000" baseline="0" dirty="0" smtClean="0"/>
-                        <a:t>, post</a:t>
+                        <a:t>, </a:t>
+                      </a:r>
+                      <a:r>
+                        <a:rPr kumimoji="1" lang="en-US" altLang="ja-JP" sz="1000" baseline="0" dirty="0" smtClean="0"/>
+                        <a:t>post </a:t>
+                      </a:r>
+                      <a:r>
+                        <a:rPr kumimoji="1" lang="en-US" altLang="ja-JP" sz="1000" baseline="0" dirty="0" smtClean="0"/>
+                        <a:t>content</a:t>
                       </a:r>
                       <a:endParaRPr kumimoji="1" lang="ja-JP" altLang="en-US" sz="1000" dirty="0"/>
                     </a:p>
@@ -19989,14 +19971,21 @@
                           <a:latin typeface="Calibri"/>
                           <a:cs typeface="Calibri"/>
                         </a:rPr>
-                        <a:t>S-5</a:t>
+                        <a:t>S</a:t>
                       </a:r>
                       <a:r>
                         <a:rPr kumimoji="1" lang="vi-VN" altLang="ja-JP" sz="1000" dirty="0" smtClean="0">
                           <a:latin typeface="Calibri"/>
                           <a:cs typeface="Calibri"/>
                         </a:rPr>
-                        <a:t>-1</a:t>
+                        <a:t>-3-</a:t>
+                      </a:r>
+                      <a:r>
+                        <a:rPr kumimoji="1" lang="vi-VN" altLang="ja-JP" sz="1000" dirty="0" smtClean="0">
+                          <a:latin typeface="Calibri"/>
+                          <a:cs typeface="Calibri"/>
+                        </a:rPr>
+                        <a:t>1</a:t>
                       </a:r>
                       <a:endParaRPr kumimoji="1" lang="ja-JP" altLang="en-US" sz="1000" dirty="0">
                         <a:latin typeface="Calibri"/>
@@ -26205,11 +26194,7 @@
             </a:r>
             <a:r>
               <a:rPr kumimoji="1" lang="en-US" altLang="ja-JP" dirty="0" smtClean="0"/>
-              <a:t>-3-2 </a:t>
-            </a:r>
-            <a:r>
-              <a:rPr kumimoji="1" lang="en-US" altLang="ja-JP" dirty="0" smtClean="0"/>
-              <a:t>Post detail</a:t>
+              <a:t>-3-2 Post detail</a:t>
             </a:r>
             <a:endParaRPr kumimoji="1" lang="ja-JP" altLang="en-US" dirty="0"/>
           </a:p>
@@ -26255,14 +26240,6 @@
           <a:lstStyle/>
           <a:p>
             <a:pPr algn="ctr"/>
-            <a:r>
-              <a:rPr kumimoji="1" lang="en-US" altLang="ja-JP" dirty="0" smtClean="0">
-                <a:solidFill>
-                  <a:srgbClr val="FF0000"/>
-                </a:solidFill>
-              </a:rPr>
-              <a:t/>
-            </a:r>
             <a:endParaRPr kumimoji="1" lang="ja-JP" altLang="en-US" dirty="0">
               <a:solidFill>
                 <a:srgbClr val="FF0000"/>
@@ -26408,7 +26385,7 @@
           <p:nvPr>
             <p:extLst>
               <p:ext uri="{D42A27DB-BD31-4B8C-83A1-F6EECF244321}">
-                <p14:modId xmlns:p14="http://schemas.microsoft.com/office/powerpoint/2010/main" val="1607235688"/>
+                <p14:modId xmlns:p14="http://schemas.microsoft.com/office/powerpoint/2010/main" val="241361784"/>
               </p:ext>
             </p:extLst>
           </p:nvPr>
@@ -26565,16 +26542,12 @@
                       </a:pPr>
                       <a:r>
                         <a:rPr kumimoji="1" lang="en-US" altLang="ja-JP" sz="1000" dirty="0" smtClean="0"/>
-                        <a:t>Show if owner of </a:t>
-                      </a:r>
-                      <a:r>
-                        <a:rPr kumimoji="1" lang="en-US" altLang="ja-JP" sz="1000" dirty="0" smtClean="0"/>
-                        <a:t>post</a:t>
+                        <a:t>Show if owner of post</a:t>
                       </a:r>
                       <a:endParaRPr kumimoji="1" lang="ja-JP" altLang="en-US" sz="1000" dirty="0"/>
                     </a:p>
                   </a:txBody>
-                  <a:tcPr/>
+                  <a:tcPr anchor="ctr" anchorCtr="1"/>
                 </a:tc>
                 <a:tc>
                   <a:txBody>
@@ -26658,7 +26631,7 @@
                       <a:endParaRPr kumimoji="1" lang="ja-JP" altLang="en-US" sz="1000" dirty="0" smtClean="0"/>
                     </a:p>
                   </a:txBody>
-                  <a:tcPr/>
+                  <a:tcPr anchor="ctr" anchorCtr="1"/>
                 </a:tc>
                 <a:tc>
                   <a:txBody>
@@ -26718,10 +26691,10 @@
                     <a:bodyPr/>
                     <a:lstStyle/>
                     <a:p>
-                      <a:endParaRPr kumimoji="1" lang="ja-JP" altLang="en-US" sz="1000"/>
-                    </a:p>
-                  </a:txBody>
-                  <a:tcPr/>
+                      <a:endParaRPr kumimoji="1" lang="ja-JP" altLang="en-US" sz="1000" dirty="0"/>
+                    </a:p>
+                  </a:txBody>
+                  <a:tcPr anchor="ctr" anchorCtr="1"/>
                 </a:tc>
                 <a:tc>
                   <a:txBody>
@@ -26805,7 +26778,7 @@
                       <a:endParaRPr kumimoji="1" lang="ja-JP" altLang="en-US" sz="1000" dirty="0"/>
                     </a:p>
                   </a:txBody>
-                  <a:tcPr/>
+                  <a:tcPr anchor="ctr" anchorCtr="1"/>
                 </a:tc>
                 <a:tc>
                   <a:txBody>
@@ -26882,7 +26855,7 @@
                       <a:endParaRPr kumimoji="1" lang="ja-JP" altLang="en-US" sz="1000" dirty="0"/>
                     </a:p>
                   </a:txBody>
-                  <a:tcPr/>
+                  <a:tcPr anchor="ctr" anchorCtr="1"/>
                 </a:tc>
                 <a:tc>
                   <a:txBody>
@@ -26990,6 +26963,13 @@
                         <a:tabLst/>
                         <a:defRPr/>
                       </a:pPr>
+                      <a:r>
+                        <a:rPr kumimoji="1" lang="en-US" altLang="ja-JP" sz="1000" dirty="0" smtClean="0">
+                          <a:latin typeface="+mn-lt"/>
+                          <a:cs typeface="Calibri"/>
+                        </a:rPr>
+                        <a:t>S-3-6</a:t>
+                      </a:r>
                       <a:endParaRPr kumimoji="1" lang="ja-JP" altLang="en-US" sz="1000" dirty="0" smtClean="0">
                         <a:latin typeface="+mn-lt"/>
                         <a:cs typeface="Calibri"/>
@@ -29066,11 +29046,7 @@
             </a:r>
             <a:r>
               <a:rPr kumimoji="1" lang="en-US" altLang="ja-JP" dirty="0" smtClean="0"/>
-              <a:t>-3-3 </a:t>
-            </a:r>
-            <a:r>
-              <a:rPr kumimoji="1" lang="en-US" altLang="ja-JP" dirty="0" smtClean="0"/>
-              <a:t>Edit profile</a:t>
+              <a:t>-3-3 Edit profile</a:t>
             </a:r>
             <a:endParaRPr kumimoji="1" lang="ja-JP" altLang="en-US" dirty="0"/>
           </a:p>
@@ -29261,14 +29237,14 @@
           <p:nvPr>
             <p:extLst>
               <p:ext uri="{D42A27DB-BD31-4B8C-83A1-F6EECF244321}">
-                <p14:modId xmlns:p14="http://schemas.microsoft.com/office/powerpoint/2010/main" val="2800807005"/>
+                <p14:modId xmlns:p14="http://schemas.microsoft.com/office/powerpoint/2010/main" val="1481684849"/>
               </p:ext>
             </p:extLst>
           </p:nvPr>
         </p:nvGraphicFramePr>
         <p:xfrm>
           <a:off x="5173132" y="1007928"/>
-          <a:ext cx="3903137" cy="2754972"/>
+          <a:ext cx="3903137" cy="3082054"/>
         </p:xfrm>
         <a:graphic>
           <a:graphicData uri="http://schemas.openxmlformats.org/drawingml/2006/table">
@@ -29729,7 +29705,7 @@
                     <a:p>
                       <a:r>
                         <a:rPr kumimoji="1" lang="en-US" altLang="ja-JP" sz="1000" dirty="0" smtClean="0"/>
-                        <a:t>Edit</a:t>
+                        <a:t>Change password</a:t>
                       </a:r>
                       <a:endParaRPr kumimoji="1" lang="ja-JP" altLang="en-US" sz="1000" dirty="0"/>
                     </a:p>
@@ -29768,24 +29744,23 @@
                         <a:tabLst/>
                         <a:defRPr/>
                       </a:pPr>
+                      <a:endParaRPr kumimoji="1" lang="ja-JP" altLang="en-US" sz="1000" dirty="0"/>
+                    </a:p>
+                  </a:txBody>
+                  <a:tcPr/>
+                </a:tc>
+                <a:tc>
+                  <a:txBody>
+                    <a:bodyPr/>
+                    <a:lstStyle/>
+                    <a:p>
                       <a:r>
-                        <a:rPr kumimoji="1" lang="en-US" altLang="ja-JP" sz="1000" dirty="0"/>
-                        <a:t>Click =&gt; </a:t>
+                        <a:rPr kumimoji="1" lang="en-US" altLang="ja-JP" sz="1000" dirty="0" smtClean="0">
+                          <a:latin typeface="Calibri"/>
+                          <a:cs typeface="Calibri"/>
+                        </a:rPr>
+                        <a:t>S-3-7</a:t>
                       </a:r>
-                      <a:r>
-                        <a:rPr kumimoji="1" lang="en-US" altLang="ja-JP" sz="1000" dirty="0" smtClean="0"/>
-                        <a:t>Edit profile</a:t>
-                      </a:r>
-                      <a:endParaRPr kumimoji="1" lang="ja-JP" altLang="en-US" sz="1000" dirty="0"/>
-                    </a:p>
-                  </a:txBody>
-                  <a:tcPr/>
-                </a:tc>
-                <a:tc>
-                  <a:txBody>
-                    <a:bodyPr/>
-                    <a:lstStyle/>
-                    <a:p>
                       <a:endParaRPr kumimoji="1" lang="ja-JP" altLang="en-US" sz="1000" dirty="0">
                         <a:latin typeface="Calibri"/>
                         <a:cs typeface="Calibri"/>
@@ -29817,7 +29792,7 @@
                     <a:p>
                       <a:r>
                         <a:rPr kumimoji="1" lang="en-US" altLang="ja-JP" sz="1000" dirty="0" smtClean="0"/>
-                        <a:t>Change password</a:t>
+                        <a:t>Cancel</a:t>
                       </a:r>
                       <a:endParaRPr kumimoji="1" lang="ja-JP" altLang="en-US" sz="1000" dirty="0"/>
                     </a:p>
@@ -29829,7 +29804,7 @@
                     <a:bodyPr/>
                     <a:lstStyle/>
                     <a:p>
-                      <a:endParaRPr kumimoji="1" lang="ja-JP" altLang="en-US" sz="1000"/>
+                      <a:endParaRPr kumimoji="1" lang="ja-JP" altLang="en-US" sz="1000" dirty="0"/>
                     </a:p>
                   </a:txBody>
                   <a:tcPr/>
@@ -29870,8 +29845,109 @@
                     <a:p>
                       <a:r>
                         <a:rPr kumimoji="1" lang="en-US" altLang="ja-JP" sz="1000" dirty="0" smtClean="0"/>
-                        <a:t>S-3-7</a:t>
+                        <a:t>S-3</a:t>
                       </a:r>
+                      <a:r>
+                        <a:rPr kumimoji="1" lang="en-US" altLang="ja-JP" sz="1000" dirty="0" smtClean="0"/>
+                        <a:t>-1</a:t>
+                      </a:r>
+                      <a:endParaRPr kumimoji="1" lang="ja-JP" altLang="en-US" sz="1000" dirty="0"/>
+                    </a:p>
+                  </a:txBody>
+                  <a:tcPr anchor="ctr" anchorCtr="1"/>
+                </a:tc>
+              </a:tr>
+              <a:tr h="327082">
+                <a:tc>
+                  <a:txBody>
+                    <a:bodyPr/>
+                    <a:lstStyle/>
+                    <a:p>
+                      <a:r>
+                        <a:rPr kumimoji="1" lang="en-US" altLang="ja-JP" sz="1000" dirty="0" smtClean="0"/>
+                        <a:t>8</a:t>
+                      </a:r>
+                      <a:endParaRPr kumimoji="1" lang="ja-JP" altLang="en-US" sz="1000" dirty="0"/>
+                    </a:p>
+                  </a:txBody>
+                  <a:tcPr anchor="ctr" anchorCtr="1"/>
+                </a:tc>
+                <a:tc>
+                  <a:txBody>
+                    <a:bodyPr/>
+                    <a:lstStyle/>
+                    <a:p>
+                      <a:r>
+                        <a:rPr kumimoji="1" lang="en-US" altLang="ja-JP" sz="1000" dirty="0" smtClean="0"/>
+                        <a:t>Edit</a:t>
+                      </a:r>
+                      <a:endParaRPr kumimoji="1" lang="ja-JP" altLang="en-US" sz="1000" dirty="0"/>
+                    </a:p>
+                  </a:txBody>
+                  <a:tcPr anchor="ctr"/>
+                </a:tc>
+                <a:tc>
+                  <a:txBody>
+                    <a:bodyPr/>
+                    <a:lstStyle/>
+                    <a:p>
+                      <a:endParaRPr kumimoji="1" lang="ja-JP" altLang="en-US" sz="1000" dirty="0"/>
+                    </a:p>
+                  </a:txBody>
+                  <a:tcPr/>
+                </a:tc>
+                <a:tc>
+                  <a:txBody>
+                    <a:bodyPr/>
+                    <a:lstStyle/>
+                    <a:p>
+                      <a:pPr marL="0" marR="0" indent="0" algn="l" defTabSz="457200" rtl="0" eaLnBrk="1" fontAlgn="auto" latinLnBrk="0" hangingPunct="1">
+                        <a:lnSpc>
+                          <a:spcPct val="100000"/>
+                        </a:lnSpc>
+                        <a:spcBef>
+                          <a:spcPts val="0"/>
+                        </a:spcBef>
+                        <a:spcAft>
+                          <a:spcPts val="0"/>
+                        </a:spcAft>
+                        <a:buClrTx/>
+                        <a:buSzTx/>
+                        <a:buFontTx/>
+                        <a:buNone/>
+                        <a:tabLst/>
+                        <a:defRPr/>
+                      </a:pPr>
+                      <a:r>
+                        <a:rPr kumimoji="1" lang="en-US" altLang="ja-JP" sz="1000" dirty="0" smtClean="0">
+                          <a:latin typeface="Calibri" panose="020F0502020204030204" pitchFamily="34" charset="0"/>
+                        </a:rPr>
+                        <a:t>Click =&gt;</a:t>
+                      </a:r>
+                      <a:r>
+                        <a:rPr kumimoji="1" lang="en-US" altLang="ja-JP" sz="1000" baseline="0" dirty="0" smtClean="0">
+                          <a:latin typeface="Calibri" panose="020F0502020204030204" pitchFamily="34" charset="0"/>
+                        </a:rPr>
+                        <a:t> </a:t>
+                      </a:r>
+                      <a:r>
+                        <a:rPr kumimoji="1" lang="en-US" altLang="ja-JP" sz="1000" baseline="0" smtClean="0">
+                          <a:latin typeface="Calibri" panose="020F0502020204030204" pitchFamily="34" charset="0"/>
+                        </a:rPr>
+                        <a:t>Edit profile</a:t>
+                      </a:r>
+                      <a:endParaRPr kumimoji="1" lang="ja-JP" altLang="en-US" sz="1000" dirty="0">
+                        <a:latin typeface="Calibri" panose="020F0502020204030204" pitchFamily="34" charset="0"/>
+                      </a:endParaRPr>
+                    </a:p>
+                  </a:txBody>
+                  <a:tcPr/>
+                </a:tc>
+                <a:tc>
+                  <a:txBody>
+                    <a:bodyPr/>
+                    <a:lstStyle/>
+                    <a:p>
                       <a:endParaRPr kumimoji="1" lang="ja-JP" altLang="en-US" sz="1000" dirty="0"/>
                     </a:p>
                   </a:txBody>
@@ -30373,8 +30449,8 @@
           <a:p>
             <a:pPr algn="ctr"/>
             <a:r>
-              <a:rPr lang="en-US" sz="1200" dirty="0" smtClean="0"/>
-              <a:t>Edit</a:t>
+              <a:rPr lang="en-US" sz="1200" dirty="0"/>
+              <a:t>Change password</a:t>
             </a:r>
             <a:endParaRPr lang="en-US" sz="1200" dirty="0"/>
           </a:p>
@@ -30511,7 +30587,7 @@
         <p:spPr>
           <a:xfrm>
             <a:off x="1826105" y="3990322"/>
-            <a:ext cx="1516891" cy="245533"/>
+            <a:ext cx="668736" cy="245533"/>
           </a:xfrm>
           <a:prstGeom prst="roundRect">
             <a:avLst/>
@@ -30538,7 +30614,7 @@
             <a:pPr algn="ctr"/>
             <a:r>
               <a:rPr lang="en-US" sz="1200" dirty="0" smtClean="0"/>
-              <a:t>Change password</a:t>
+              <a:t>Cancel</a:t>
             </a:r>
             <a:endParaRPr lang="en-US" sz="1200" dirty="0"/>
           </a:p>
@@ -30722,7 +30798,7 @@
         </p:nvSpPr>
         <p:spPr>
           <a:xfrm>
-            <a:off x="3277637" y="3989634"/>
+            <a:off x="2413784" y="4148772"/>
             <a:ext cx="327433" cy="246221"/>
           </a:xfrm>
           <a:prstGeom prst="rect">
@@ -30781,6 +30857,86 @@
                 </a:solidFill>
               </a:rPr>
               <a:t>(2)</a:t>
+            </a:r>
+            <a:endParaRPr kumimoji="1" lang="ja-JP" altLang="en-US" sz="1000" dirty="0">
+              <a:solidFill>
+                <a:srgbClr val="FF0000"/>
+              </a:solidFill>
+            </a:endParaRPr>
+          </a:p>
+        </p:txBody>
+      </p:sp>
+      <p:sp>
+        <p:nvSpPr>
+          <p:cNvPr id="28" name="Rounded Rectangle 27"/>
+          <p:cNvSpPr/>
+          <p:nvPr/>
+        </p:nvSpPr>
+        <p:spPr>
+          <a:xfrm>
+            <a:off x="2674260" y="3986687"/>
+            <a:ext cx="668736" cy="245533"/>
+          </a:xfrm>
+          <a:prstGeom prst="roundRect">
+            <a:avLst/>
+          </a:prstGeom>
+        </p:spPr>
+        <p:style>
+          <a:lnRef idx="1">
+            <a:schemeClr val="accent1"/>
+          </a:lnRef>
+          <a:fillRef idx="3">
+            <a:schemeClr val="accent1"/>
+          </a:fillRef>
+          <a:effectRef idx="2">
+            <a:schemeClr val="accent1"/>
+          </a:effectRef>
+          <a:fontRef idx="minor">
+            <a:schemeClr val="lt1"/>
+          </a:fontRef>
+        </p:style>
+        <p:txBody>
+          <a:bodyPr rtlCol="0" anchor="ctr" anchorCtr="1"/>
+          <a:lstStyle/>
+          <a:p>
+            <a:pPr algn="ctr"/>
+            <a:r>
+              <a:rPr lang="en-US" sz="1200" dirty="0" smtClean="0"/>
+              <a:t>Edit</a:t>
+            </a:r>
+            <a:endParaRPr lang="en-US" sz="1200" dirty="0"/>
+          </a:p>
+        </p:txBody>
+      </p:sp>
+      <p:sp>
+        <p:nvSpPr>
+          <p:cNvPr id="29" name="TextBox 28"/>
+          <p:cNvSpPr txBox="1"/>
+          <p:nvPr/>
+        </p:nvSpPr>
+        <p:spPr>
+          <a:xfrm>
+            <a:off x="3270017" y="4139765"/>
+            <a:ext cx="327433" cy="246221"/>
+          </a:xfrm>
+          <a:prstGeom prst="rect">
+            <a:avLst/>
+          </a:prstGeom>
+          <a:noFill/>
+        </p:spPr>
+        <p:txBody>
+          <a:bodyPr wrap="none" rtlCol="0">
+            <a:spAutoFit/>
+          </a:bodyPr>
+          <a:lstStyle/>
+          <a:p>
+            <a:r>
+              <a:rPr kumimoji="1" lang="en-US" altLang="ja-JP" sz="1000" dirty="0" smtClean="0">
+                <a:solidFill>
+                  <a:srgbClr val="FF0000"/>
+                </a:solidFill>
+              </a:rPr>
+              <a:t>(8)</a:t>
             </a:r>
             <a:endParaRPr kumimoji="1" lang="ja-JP" altLang="en-US" sz="1000" dirty="0">
               <a:solidFill>
@@ -31076,7 +31232,7 @@
           <p:nvPr>
             <p:extLst>
               <p:ext uri="{D42A27DB-BD31-4B8C-83A1-F6EECF244321}">
-                <p14:modId xmlns:p14="http://schemas.microsoft.com/office/powerpoint/2010/main" val="448475964"/>
+                <p14:modId xmlns:p14="http://schemas.microsoft.com/office/powerpoint/2010/main" val="1908805947"/>
               </p:ext>
             </p:extLst>
           </p:nvPr>
@@ -31251,14 +31407,21 @@
                           <a:latin typeface="Calibri"/>
                           <a:cs typeface="Calibri"/>
                         </a:rPr>
-                        <a:t>-3-</a:t>
+                        <a:t>-3</a:t>
+                      </a:r>
+                      <a:r>
+                        <a:rPr kumimoji="1" lang="vi-VN" altLang="ja-JP" sz="1000" dirty="0" smtClean="0">
+                          <a:latin typeface="Calibri"/>
+                          <a:cs typeface="Calibri"/>
+                        </a:rPr>
+                        <a:t>-</a:t>
                       </a:r>
                       <a:r>
                         <a:rPr kumimoji="1" lang="vi-VN" altLang="ja-JP" sz="1000" dirty="0">
                           <a:latin typeface="Calibri"/>
                           <a:cs typeface="Calibri"/>
                         </a:rPr>
-                        <a:t>1</a:t>
+                        <a:t>3</a:t>
                       </a:r>
                       <a:endParaRPr kumimoji="1" lang="ja-JP" altLang="en-US" sz="1000" dirty="0">
                         <a:latin typeface="Calibri"/>
@@ -32970,11 +33133,7 @@
             </a:r>
             <a:r>
               <a:rPr kumimoji="1" lang="en-US" altLang="ja-JP" dirty="0" smtClean="0"/>
-              <a:t>-3-5 </a:t>
-            </a:r>
-            <a:r>
-              <a:rPr kumimoji="1" lang="en-US" altLang="ja-JP" dirty="0" smtClean="0"/>
-              <a:t>Edit post</a:t>
+              <a:t>-3-5 Edit post</a:t>
             </a:r>
             <a:endParaRPr kumimoji="1" lang="ja-JP" altLang="en-US" dirty="0"/>
           </a:p>
@@ -33020,14 +33179,6 @@
           <a:lstStyle/>
           <a:p>
             <a:pPr algn="ctr"/>
-            <a:r>
-              <a:rPr kumimoji="1" lang="en-US" altLang="ja-JP" dirty="0" smtClean="0">
-                <a:solidFill>
-                  <a:srgbClr val="FF0000"/>
-                </a:solidFill>
-              </a:rPr>
-              <a:t/>
-            </a:r>
             <a:endParaRPr kumimoji="1" lang="ja-JP" altLang="en-US" dirty="0">
               <a:solidFill>
                 <a:srgbClr val="FF0000"/>

</xml_diff>